<commit_message>
change partial differential eq, but need boundary condition
</commit_message>
<xml_diff>
--- a/slide/0519.pptx
+++ b/slide/0519.pptx
@@ -207,7 +207,7 @@
           <a:p>
             <a:fld id="{438A1740-9A82-46DA-AD96-0DC60E5E9FA3}" type="datetimeFigureOut">
               <a:rPr kumimoji="1" lang="ja-JP" altLang="en-US" smtClean="0"/>
-              <a:t>2022/5/19</a:t>
+              <a:t>2022/6/28</a:t>
             </a:fld>
             <a:endParaRPr kumimoji="1" lang="ja-JP" altLang="en-US"/>
           </a:p>
@@ -551,95 +551,10 @@
           <a:lstStyle/>
           <a:p>
             <a:r>
-              <a:rPr lang="ja-JP" altLang="en-US" b="0" i="0" dirty="0">
-                <a:solidFill>
-                  <a:srgbClr val="333333"/>
-                </a:solidFill>
-                <a:effectLst/>
-                <a:latin typeface="Arial" panose="020B0604020202020204" pitchFamily="34" charset="0"/>
-              </a:rPr>
-              <a:t>近赤外光が生体組織を透過しやすいことを利用し，数</a:t>
-            </a:r>
-            <a:r>
-              <a:rPr lang="en-US" altLang="ja-JP" b="0" i="0" dirty="0">
-                <a:solidFill>
-                  <a:srgbClr val="333333"/>
-                </a:solidFill>
-                <a:effectLst/>
-                <a:latin typeface="Arial" panose="020B0604020202020204" pitchFamily="34" charset="0"/>
-              </a:rPr>
-              <a:t>cm</a:t>
-            </a:r>
-            <a:r>
-              <a:rPr lang="ja-JP" altLang="en-US" b="0" i="0" dirty="0">
-                <a:solidFill>
-                  <a:srgbClr val="333333"/>
-                </a:solidFill>
-                <a:effectLst/>
-                <a:latin typeface="Arial" panose="020B0604020202020204" pitchFamily="34" charset="0"/>
-              </a:rPr>
-              <a:t>以上の比較的厚い組織を対象としている．</a:t>
-            </a:r>
-            <a:endParaRPr lang="en-US" altLang="ja-JP" b="0" i="0" dirty="0">
-              <a:solidFill>
-                <a:srgbClr val="333333"/>
-              </a:solidFill>
-              <a:effectLst/>
-              <a:latin typeface="Arial" panose="020B0604020202020204" pitchFamily="34" charset="0"/>
-            </a:endParaRPr>
-          </a:p>
-          <a:p>
-            <a:r>
-              <a:rPr lang="ja-JP" altLang="en-US" b="0" i="0" dirty="0">
-                <a:solidFill>
-                  <a:srgbClr val="333333"/>
-                </a:solidFill>
-                <a:effectLst/>
-                <a:latin typeface="Arial" panose="020B0604020202020204" pitchFamily="34" charset="0"/>
-              </a:rPr>
-              <a:t>この拡散光トモグラフィーの研究は</a:t>
-            </a:r>
-            <a:r>
-              <a:rPr lang="en-US" altLang="ja-JP" b="0" i="0" dirty="0">
-                <a:solidFill>
-                  <a:srgbClr val="333333"/>
-                </a:solidFill>
-                <a:effectLst/>
-                <a:latin typeface="Arial" panose="020B0604020202020204" pitchFamily="34" charset="0"/>
-              </a:rPr>
-              <a:t>1990</a:t>
-            </a:r>
-            <a:r>
-              <a:rPr lang="ja-JP" altLang="en-US" b="0" i="0" dirty="0">
-                <a:solidFill>
-                  <a:srgbClr val="333333"/>
-                </a:solidFill>
-                <a:effectLst/>
-                <a:latin typeface="Arial" panose="020B0604020202020204" pitchFamily="34" charset="0"/>
-              </a:rPr>
-              <a:t>年代初めから世界各国で開始された．</a:t>
-            </a:r>
-            <a:r>
-              <a:rPr lang="en-US" altLang="ja-JP" b="0" i="0" dirty="0">
-                <a:solidFill>
-                  <a:srgbClr val="333333"/>
-                </a:solidFill>
-                <a:effectLst/>
-                <a:latin typeface="Arial" panose="020B0604020202020204" pitchFamily="34" charset="0"/>
-              </a:rPr>
-              <a:t>2000</a:t>
-            </a:r>
-            <a:r>
-              <a:rPr lang="ja-JP" altLang="en-US" b="0" i="0" dirty="0">
-                <a:solidFill>
-                  <a:srgbClr val="333333"/>
-                </a:solidFill>
-                <a:effectLst/>
-                <a:latin typeface="Arial" panose="020B0604020202020204" pitchFamily="34" charset="0"/>
-              </a:rPr>
-              <a:t>年以降，拡散反射光から断層像を得るアルゴリズムである光マッピングという手法も開発されている</a:t>
-            </a:r>
-            <a:endParaRPr kumimoji="1" lang="ja-JP" altLang="en-US" dirty="0"/>
+              <a:rPr kumimoji="1" lang="en-US" altLang="ja-JP"/>
+              <a:t>https://takun-physics.net/9954/</a:t>
+            </a:r>
+            <a:endParaRPr kumimoji="1" lang="ja-JP" altLang="en-US"/>
           </a:p>
         </p:txBody>
       </p:sp>
@@ -660,7 +575,7 @@
           <a:p>
             <a:fld id="{EF7C5CA3-E3F9-4CDC-A2DC-589CC3C7528D}" type="slidenum">
               <a:rPr kumimoji="1" lang="ja-JP" altLang="en-US" smtClean="0"/>
-              <a:t>2</a:t>
+              <a:t>1</a:t>
             </a:fld>
             <a:endParaRPr kumimoji="1" lang="ja-JP" altLang="en-US"/>
           </a:p>
@@ -669,7 +584,7 @@
     </p:spTree>
     <p:extLst>
       <p:ext uri="{BB962C8B-B14F-4D97-AF65-F5344CB8AC3E}">
-        <p14:creationId xmlns:p14="http://schemas.microsoft.com/office/powerpoint/2010/main" val="3027434786"/>
+        <p14:creationId xmlns:p14="http://schemas.microsoft.com/office/powerpoint/2010/main" val="3883225884"/>
       </p:ext>
     </p:extLst>
   </p:cSld>
@@ -731,7 +646,86 @@
                 <a:effectLst/>
                 <a:latin typeface="Arial" panose="020B0604020202020204" pitchFamily="34" charset="0"/>
               </a:rPr>
-              <a:t>比較的厚い組織を通った近赤外光は，直進性などの波動性を失い，強く散乱される結果，生体組織内を拡散的に伝搬する</a:t>
+              <a:t>近赤外光が生体組織を透過しやすいことを利用し，数</a:t>
+            </a:r>
+            <a:r>
+              <a:rPr lang="en-US" altLang="ja-JP" b="0" i="0" dirty="0">
+                <a:solidFill>
+                  <a:srgbClr val="333333"/>
+                </a:solidFill>
+                <a:effectLst/>
+                <a:latin typeface="Arial" panose="020B0604020202020204" pitchFamily="34" charset="0"/>
+              </a:rPr>
+              <a:t>cm</a:t>
+            </a:r>
+            <a:r>
+              <a:rPr lang="ja-JP" altLang="en-US" b="0" i="0" dirty="0">
+                <a:solidFill>
+                  <a:srgbClr val="333333"/>
+                </a:solidFill>
+                <a:effectLst/>
+                <a:latin typeface="Arial" panose="020B0604020202020204" pitchFamily="34" charset="0"/>
+              </a:rPr>
+              <a:t>以上の比較的厚い組織を対象としている．</a:t>
+            </a:r>
+            <a:endParaRPr lang="en-US" altLang="ja-JP" b="0" i="0" dirty="0">
+              <a:solidFill>
+                <a:srgbClr val="333333"/>
+              </a:solidFill>
+              <a:effectLst/>
+              <a:latin typeface="Arial" panose="020B0604020202020204" pitchFamily="34" charset="0"/>
+            </a:endParaRPr>
+          </a:p>
+          <a:p>
+            <a:r>
+              <a:rPr lang="ja-JP" altLang="en-US" b="0" i="0" dirty="0">
+                <a:solidFill>
+                  <a:srgbClr val="333333"/>
+                </a:solidFill>
+                <a:effectLst/>
+                <a:latin typeface="Arial" panose="020B0604020202020204" pitchFamily="34" charset="0"/>
+              </a:rPr>
+              <a:t>この拡散光トモグラフィーの研究は</a:t>
+            </a:r>
+            <a:r>
+              <a:rPr lang="en-US" altLang="ja-JP" b="0" i="0" dirty="0">
+                <a:solidFill>
+                  <a:srgbClr val="333333"/>
+                </a:solidFill>
+                <a:effectLst/>
+                <a:latin typeface="Arial" panose="020B0604020202020204" pitchFamily="34" charset="0"/>
+              </a:rPr>
+              <a:t>1990</a:t>
+            </a:r>
+            <a:r>
+              <a:rPr lang="ja-JP" altLang="en-US" b="0" i="0" dirty="0">
+                <a:solidFill>
+                  <a:srgbClr val="333333"/>
+                </a:solidFill>
+                <a:effectLst/>
+                <a:latin typeface="Arial" panose="020B0604020202020204" pitchFamily="34" charset="0"/>
+              </a:rPr>
+              <a:t>年代初めから世界各国で開始された．</a:t>
+            </a:r>
+            <a:r>
+              <a:rPr lang="en-US" altLang="ja-JP" b="0" i="0" dirty="0">
+                <a:solidFill>
+                  <a:srgbClr val="333333"/>
+                </a:solidFill>
+                <a:effectLst/>
+                <a:latin typeface="Arial" panose="020B0604020202020204" pitchFamily="34" charset="0"/>
+              </a:rPr>
+              <a:t>2000</a:t>
+            </a:r>
+            <a:r>
+              <a:rPr lang="ja-JP" altLang="en-US" b="0" i="0" dirty="0">
+                <a:solidFill>
+                  <a:srgbClr val="333333"/>
+                </a:solidFill>
+                <a:effectLst/>
+                <a:latin typeface="Arial" panose="020B0604020202020204" pitchFamily="34" charset="0"/>
+              </a:rPr>
+              <a:t>年以降，拡散反射光から断層像を得るアルゴリズムである光マッピングという手法も開発されている</a:t>
             </a:r>
             <a:endParaRPr kumimoji="1" lang="ja-JP" altLang="en-US" dirty="0"/>
           </a:p>
@@ -754,7 +748,7 @@
           <a:p>
             <a:fld id="{EF7C5CA3-E3F9-4CDC-A2DC-589CC3C7528D}" type="slidenum">
               <a:rPr kumimoji="1" lang="ja-JP" altLang="en-US" smtClean="0"/>
-              <a:t>3</a:t>
+              <a:t>2</a:t>
             </a:fld>
             <a:endParaRPr kumimoji="1" lang="ja-JP" altLang="en-US"/>
           </a:p>
@@ -763,7 +757,7 @@
     </p:spTree>
     <p:extLst>
       <p:ext uri="{BB962C8B-B14F-4D97-AF65-F5344CB8AC3E}">
-        <p14:creationId xmlns:p14="http://schemas.microsoft.com/office/powerpoint/2010/main" val="2287743870"/>
+        <p14:creationId xmlns:p14="http://schemas.microsoft.com/office/powerpoint/2010/main" val="3027434786"/>
       </p:ext>
     </p:extLst>
   </p:cSld>
@@ -818,64 +812,15 @@
           <a:lstStyle/>
           <a:p>
             <a:r>
-              <a:rPr lang="ja-JP" altLang="en-US" dirty="0"/>
-              <a:t>輸送方程式では散乱体内部のエネルギー伝播を正確に表す方程式，しかし，三次元位置，方向，時間と</a:t>
-            </a:r>
-            <a:r>
-              <a:rPr lang="en-US" altLang="ja-JP" dirty="0"/>
-              <a:t>6</a:t>
-            </a:r>
-            <a:r>
-              <a:rPr lang="ja-JP" altLang="en-US" dirty="0"/>
-              <a:t>自由度もち，解を得るのが難しい．</a:t>
-            </a:r>
-          </a:p>
-          <a:p>
-            <a:r>
-              <a:rPr lang="ja-JP" altLang="en-US" dirty="0"/>
-              <a:t>生体組織のような拡散に近い散乱では，光はほぼ等方的に伝播する．そこで，この光の等方散乱性を導入すると，輸送方程式は光拡散近似により，光拡散方程式に変換するができる．</a:t>
-            </a:r>
-          </a:p>
-          <a:p>
-            <a:r>
-              <a:rPr lang="ja-JP" altLang="en-US" dirty="0"/>
-              <a:t>光拡散方程式は簡単な形状であっても解析的に解くことは難しい．</a:t>
-            </a:r>
-          </a:p>
-          <a:p>
-            <a:r>
-              <a:rPr lang="ja-JP" altLang="en-US" dirty="0"/>
-              <a:t>有限要素法で解かれることが多いが，組織の不均一性，複雑な形状，複雑な境界条件，先見情報を組み込むことができる．</a:t>
-            </a:r>
-            <a:endParaRPr lang="en-US" altLang="ja-JP" dirty="0"/>
-          </a:p>
-          <a:p>
-            <a:r>
-              <a:rPr lang="en-US" altLang="ja-JP" dirty="0"/>
-              <a:t>G</a:t>
-            </a:r>
-            <a:r>
-              <a:rPr lang="ja-JP" altLang="en-US" dirty="0"/>
-              <a:t>は非等方散乱パラメータ，</a:t>
-            </a:r>
-            <a:r>
-              <a:rPr lang="en-US" altLang="ja-JP" dirty="0"/>
-              <a:t>g=1</a:t>
-            </a:r>
-            <a:r>
-              <a:rPr lang="ja-JP" altLang="en-US" dirty="0"/>
-              <a:t>で完全な前方散乱，</a:t>
-            </a:r>
-            <a:r>
-              <a:rPr lang="en-US" altLang="ja-JP" dirty="0"/>
-              <a:t>g=0</a:t>
-            </a:r>
-            <a:r>
-              <a:rPr lang="ja-JP" altLang="en-US" dirty="0"/>
-              <a:t>で等方散乱，場所ごとに設定する</a:t>
-            </a:r>
-          </a:p>
-          <a:p>
+              <a:rPr lang="ja-JP" altLang="en-US" b="0" i="0" dirty="0">
+                <a:solidFill>
+                  <a:srgbClr val="333333"/>
+                </a:solidFill>
+                <a:effectLst/>
+                <a:latin typeface="Arial" panose="020B0604020202020204" pitchFamily="34" charset="0"/>
+              </a:rPr>
+              <a:t>比較的厚い組織を通った近赤外光は，直進性などの波動性を失い，強く散乱される結果，生体組織内を拡散的に伝搬する</a:t>
+            </a:r>
             <a:endParaRPr kumimoji="1" lang="ja-JP" altLang="en-US" dirty="0"/>
           </a:p>
         </p:txBody>
@@ -897,7 +842,7 @@
           <a:p>
             <a:fld id="{EF7C5CA3-E3F9-4CDC-A2DC-589CC3C7528D}" type="slidenum">
               <a:rPr kumimoji="1" lang="ja-JP" altLang="en-US" smtClean="0"/>
-              <a:t>6</a:t>
+              <a:t>3</a:t>
             </a:fld>
             <a:endParaRPr kumimoji="1" lang="ja-JP" altLang="en-US"/>
           </a:p>
@@ -906,7 +851,7 @@
     </p:spTree>
     <p:extLst>
       <p:ext uri="{BB962C8B-B14F-4D97-AF65-F5344CB8AC3E}">
-        <p14:creationId xmlns:p14="http://schemas.microsoft.com/office/powerpoint/2010/main" val="3974338205"/>
+        <p14:creationId xmlns:p14="http://schemas.microsoft.com/office/powerpoint/2010/main" val="2287743870"/>
       </p:ext>
     </p:extLst>
   </p:cSld>
@@ -961,34 +906,65 @@
           <a:lstStyle/>
           <a:p>
             <a:r>
-              <a:rPr kumimoji="1" lang="ja-JP" altLang="en-US" dirty="0"/>
-              <a:t>偏微分方程式の解は初期条件と境界条件を満たす必要がある．</a:t>
-            </a:r>
-            <a:endParaRPr kumimoji="1" lang="en-US" altLang="ja-JP" dirty="0"/>
+              <a:rPr lang="ja-JP" altLang="en-US" dirty="0"/>
+              <a:t>輸送方程式では散乱体内部のエネルギー伝播を正確に表す方程式，しかし，三次元位置，方向，時間と</a:t>
+            </a:r>
+            <a:r>
+              <a:rPr lang="en-US" altLang="ja-JP" dirty="0"/>
+              <a:t>6</a:t>
+            </a:r>
+            <a:r>
+              <a:rPr lang="ja-JP" altLang="en-US" dirty="0"/>
+              <a:t>自由度もち，解を得るのが難しい．</a:t>
+            </a:r>
           </a:p>
           <a:p>
             <a:r>
-              <a:rPr kumimoji="1" lang="ja-JP" altLang="en-US" dirty="0"/>
-              <a:t>初期状態は時刻</a:t>
-            </a:r>
-            <a:r>
-              <a:rPr kumimoji="1" lang="en-US" altLang="ja-JP" dirty="0"/>
-              <a:t>0</a:t>
-            </a:r>
-            <a:r>
-              <a:rPr kumimoji="1" lang="ja-JP" altLang="en-US" dirty="0"/>
-              <a:t>の時に満たす条件で，散乱係数の分布や入射光など</a:t>
-            </a:r>
-            <a:endParaRPr kumimoji="1" lang="en-US" altLang="ja-JP" dirty="0"/>
+              <a:rPr lang="ja-JP" altLang="en-US" dirty="0"/>
+              <a:t>生体組織のような拡散に近い散乱では，光はほぼ等方的に伝播する．そこで，この光の等方散乱性を導入すると，輸送方程式は光拡散近似により，光拡散方程式に変換するができる．</a:t>
+            </a:r>
           </a:p>
           <a:p>
-            <a:endParaRPr kumimoji="1" lang="en-US" altLang="ja-JP" dirty="0"/>
+            <a:r>
+              <a:rPr lang="ja-JP" altLang="en-US" dirty="0"/>
+              <a:t>光拡散方程式は簡単な形状であっても解析的に解くことは難しい．</a:t>
+            </a:r>
           </a:p>
           <a:p>
             <a:r>
-              <a:rPr kumimoji="1" lang="ja-JP" altLang="en-US" dirty="0"/>
-              <a:t>境界条件はこんなかんじ</a:t>
-            </a:r>
+              <a:rPr lang="ja-JP" altLang="en-US" dirty="0"/>
+              <a:t>有限要素法で解かれることが多いが，組織の不均一性，複雑な形状，複雑な境界条件，先見情報を組み込むことができる．</a:t>
+            </a:r>
+            <a:endParaRPr lang="en-US" altLang="ja-JP" dirty="0"/>
+          </a:p>
+          <a:p>
+            <a:r>
+              <a:rPr lang="en-US" altLang="ja-JP" dirty="0"/>
+              <a:t>G</a:t>
+            </a:r>
+            <a:r>
+              <a:rPr lang="ja-JP" altLang="en-US" dirty="0"/>
+              <a:t>は非等方散乱パラメータ，</a:t>
+            </a:r>
+            <a:r>
+              <a:rPr lang="en-US" altLang="ja-JP" dirty="0"/>
+              <a:t>g=1</a:t>
+            </a:r>
+            <a:r>
+              <a:rPr lang="ja-JP" altLang="en-US" dirty="0"/>
+              <a:t>で完全な前方散乱，</a:t>
+            </a:r>
+            <a:r>
+              <a:rPr lang="en-US" altLang="ja-JP" dirty="0"/>
+              <a:t>g=0</a:t>
+            </a:r>
+            <a:r>
+              <a:rPr lang="ja-JP" altLang="en-US" dirty="0"/>
+              <a:t>で等方散乱，場所ごとに設定する</a:t>
+            </a:r>
+          </a:p>
+          <a:p>
+            <a:endParaRPr kumimoji="1" lang="ja-JP" altLang="en-US" dirty="0"/>
           </a:p>
         </p:txBody>
       </p:sp>
@@ -1009,7 +985,7 @@
           <a:p>
             <a:fld id="{EF7C5CA3-E3F9-4CDC-A2DC-589CC3C7528D}" type="slidenum">
               <a:rPr kumimoji="1" lang="ja-JP" altLang="en-US" smtClean="0"/>
-              <a:t>7</a:t>
+              <a:t>6</a:t>
             </a:fld>
             <a:endParaRPr kumimoji="1" lang="ja-JP" altLang="en-US"/>
           </a:p>
@@ -1018,7 +994,7 @@
     </p:spTree>
     <p:extLst>
       <p:ext uri="{BB962C8B-B14F-4D97-AF65-F5344CB8AC3E}">
-        <p14:creationId xmlns:p14="http://schemas.microsoft.com/office/powerpoint/2010/main" val="802928886"/>
+        <p14:creationId xmlns:p14="http://schemas.microsoft.com/office/powerpoint/2010/main" val="3974338205"/>
       </p:ext>
     </p:extLst>
   </p:cSld>
@@ -1073,10 +1049,34 @@
           <a:lstStyle/>
           <a:p>
             <a:r>
-              <a:rPr lang="ja-JP" altLang="en-US" dirty="0"/>
-              <a:t>観測される光強度は出力面において、散乱媒体内部から外部に向けて流出する光の放射エネルギー流束の、出力面に対する垂直方向成分として次式で表される</a:t>
-            </a:r>
-            <a:endParaRPr kumimoji="1" lang="ja-JP" altLang="en-US" dirty="0"/>
+              <a:rPr kumimoji="1" lang="ja-JP" altLang="en-US" dirty="0"/>
+              <a:t>偏微分方程式の解は初期条件と境界条件を満たす必要がある．</a:t>
+            </a:r>
+            <a:endParaRPr kumimoji="1" lang="en-US" altLang="ja-JP" dirty="0"/>
+          </a:p>
+          <a:p>
+            <a:r>
+              <a:rPr kumimoji="1" lang="ja-JP" altLang="en-US" dirty="0"/>
+              <a:t>初期状態は時刻</a:t>
+            </a:r>
+            <a:r>
+              <a:rPr kumimoji="1" lang="en-US" altLang="ja-JP" dirty="0"/>
+              <a:t>0</a:t>
+            </a:r>
+            <a:r>
+              <a:rPr kumimoji="1" lang="ja-JP" altLang="en-US" dirty="0"/>
+              <a:t>の時に満たす条件で，散乱係数の分布や入射光など</a:t>
+            </a:r>
+            <a:endParaRPr kumimoji="1" lang="en-US" altLang="ja-JP" dirty="0"/>
+          </a:p>
+          <a:p>
+            <a:endParaRPr kumimoji="1" lang="en-US" altLang="ja-JP" dirty="0"/>
+          </a:p>
+          <a:p>
+            <a:r>
+              <a:rPr kumimoji="1" lang="ja-JP" altLang="en-US" dirty="0"/>
+              <a:t>境界条件はこんなかんじ</a:t>
+            </a:r>
           </a:p>
         </p:txBody>
       </p:sp>
@@ -1097,7 +1097,7 @@
           <a:p>
             <a:fld id="{EF7C5CA3-E3F9-4CDC-A2DC-589CC3C7528D}" type="slidenum">
               <a:rPr kumimoji="1" lang="ja-JP" altLang="en-US" smtClean="0"/>
-              <a:t>8</a:t>
+              <a:t>7</a:t>
             </a:fld>
             <a:endParaRPr kumimoji="1" lang="ja-JP" altLang="en-US"/>
           </a:p>
@@ -1106,7 +1106,7 @@
     </p:spTree>
     <p:extLst>
       <p:ext uri="{BB962C8B-B14F-4D97-AF65-F5344CB8AC3E}">
-        <p14:creationId xmlns:p14="http://schemas.microsoft.com/office/powerpoint/2010/main" val="573012434"/>
+        <p14:creationId xmlns:p14="http://schemas.microsoft.com/office/powerpoint/2010/main" val="802928886"/>
       </p:ext>
     </p:extLst>
   </p:cSld>
@@ -1161,16 +1161,10 @@
           <a:lstStyle/>
           <a:p>
             <a:r>
-              <a:rPr kumimoji="1" lang="ja-JP" altLang="en-US" dirty="0"/>
-              <a:t>電場とか音場とか</a:t>
-            </a:r>
-            <a:endParaRPr kumimoji="1" lang="en-US" altLang="ja-JP" dirty="0"/>
-          </a:p>
-          <a:p>
-            <a:r>
-              <a:rPr kumimoji="1" lang="ja-JP" altLang="en-US" dirty="0"/>
-              <a:t>有限要素法は</a:t>
-            </a:r>
+              <a:rPr lang="ja-JP" altLang="en-US" dirty="0"/>
+              <a:t>観測される光強度は出力面において、散乱媒体内部から外部に向けて流出する光の放射エネルギー流束の、出力面に対する垂直方向成分として次式で表される</a:t>
+            </a:r>
+            <a:endParaRPr kumimoji="1" lang="ja-JP" altLang="en-US" dirty="0"/>
           </a:p>
         </p:txBody>
       </p:sp>
@@ -1191,7 +1185,7 @@
           <a:p>
             <a:fld id="{EF7C5CA3-E3F9-4CDC-A2DC-589CC3C7528D}" type="slidenum">
               <a:rPr kumimoji="1" lang="ja-JP" altLang="en-US" smtClean="0"/>
-              <a:t>9</a:t>
+              <a:t>8</a:t>
             </a:fld>
             <a:endParaRPr kumimoji="1" lang="ja-JP" altLang="en-US"/>
           </a:p>
@@ -1200,7 +1194,7 @@
     </p:spTree>
     <p:extLst>
       <p:ext uri="{BB962C8B-B14F-4D97-AF65-F5344CB8AC3E}">
-        <p14:creationId xmlns:p14="http://schemas.microsoft.com/office/powerpoint/2010/main" val="1516750805"/>
+        <p14:creationId xmlns:p14="http://schemas.microsoft.com/office/powerpoint/2010/main" val="573012434"/>
       </p:ext>
     </p:extLst>
   </p:cSld>
@@ -1255,6 +1249,100 @@
           <a:lstStyle/>
           <a:p>
             <a:r>
+              <a:rPr kumimoji="1" lang="ja-JP" altLang="en-US" dirty="0"/>
+              <a:t>電場とか音場とか</a:t>
+            </a:r>
+            <a:endParaRPr kumimoji="1" lang="en-US" altLang="ja-JP" dirty="0"/>
+          </a:p>
+          <a:p>
+            <a:r>
+              <a:rPr kumimoji="1" lang="ja-JP" altLang="en-US" dirty="0"/>
+              <a:t>有限要素法は</a:t>
+            </a:r>
+          </a:p>
+        </p:txBody>
+      </p:sp>
+      <p:sp>
+        <p:nvSpPr>
+          <p:cNvPr id="4" name="スライド番号プレースホルダー 3"/>
+          <p:cNvSpPr>
+            <a:spLocks noGrp="1"/>
+          </p:cNvSpPr>
+          <p:nvPr>
+            <p:ph type="sldNum" sz="quarter" idx="5"/>
+          </p:nvPr>
+        </p:nvSpPr>
+        <p:spPr/>
+        <p:txBody>
+          <a:bodyPr/>
+          <a:lstStyle/>
+          <a:p>
+            <a:fld id="{EF7C5CA3-E3F9-4CDC-A2DC-589CC3C7528D}" type="slidenum">
+              <a:rPr kumimoji="1" lang="ja-JP" altLang="en-US" smtClean="0"/>
+              <a:t>9</a:t>
+            </a:fld>
+            <a:endParaRPr kumimoji="1" lang="ja-JP" altLang="en-US"/>
+          </a:p>
+        </p:txBody>
+      </p:sp>
+    </p:spTree>
+    <p:extLst>
+      <p:ext uri="{BB962C8B-B14F-4D97-AF65-F5344CB8AC3E}">
+        <p14:creationId xmlns:p14="http://schemas.microsoft.com/office/powerpoint/2010/main" val="1516750805"/>
+      </p:ext>
+    </p:extLst>
+  </p:cSld>
+  <p:clrMapOvr>
+    <a:masterClrMapping/>
+  </p:clrMapOvr>
+</p:notes>
+</file>
+
+<file path=ppt/notesSlides/notesSlide8.xml><?xml version="1.0" encoding="utf-8"?>
+<p:notes xmlns:a="http://schemas.openxmlformats.org/drawingml/2006/main" xmlns:r="http://schemas.openxmlformats.org/officeDocument/2006/relationships" xmlns:p="http://schemas.openxmlformats.org/presentationml/2006/main">
+  <p:cSld>
+    <p:spTree>
+      <p:nvGrpSpPr>
+        <p:cNvPr id="1" name=""/>
+        <p:cNvGrpSpPr/>
+        <p:nvPr/>
+      </p:nvGrpSpPr>
+      <p:grpSpPr>
+        <a:xfrm>
+          <a:off x="0" y="0"/>
+          <a:ext cx="0" cy="0"/>
+          <a:chOff x="0" y="0"/>
+          <a:chExt cx="0" cy="0"/>
+        </a:xfrm>
+      </p:grpSpPr>
+      <p:sp>
+        <p:nvSpPr>
+          <p:cNvPr id="2" name="スライド イメージ プレースホルダー 1"/>
+          <p:cNvSpPr>
+            <a:spLocks noGrp="1" noRot="1" noChangeAspect="1"/>
+          </p:cNvSpPr>
+          <p:nvPr>
+            <p:ph type="sldImg"/>
+          </p:nvPr>
+        </p:nvSpPr>
+        <p:spPr/>
+      </p:sp>
+      <p:sp>
+        <p:nvSpPr>
+          <p:cNvPr id="3" name="ノート プレースホルダー 2"/>
+          <p:cNvSpPr>
+            <a:spLocks noGrp="1"/>
+          </p:cNvSpPr>
+          <p:nvPr>
+            <p:ph type="body" idx="1"/>
+          </p:nvPr>
+        </p:nvSpPr>
+        <p:spPr/>
+        <p:txBody>
+          <a:bodyPr/>
+          <a:lstStyle/>
+          <a:p>
+            <a:r>
               <a:rPr kumimoji="1" lang="en-US" altLang="ja-JP" dirty="0" err="1"/>
               <a:t>Φt</a:t>
             </a:r>
@@ -1326,7 +1414,7 @@
 </p:notes>
 </file>
 
-<file path=ppt/notesSlides/notesSlide8.xml><?xml version="1.0" encoding="utf-8"?>
+<file path=ppt/notesSlides/notesSlide9.xml><?xml version="1.0" encoding="utf-8"?>
 <p:notes xmlns:a="http://schemas.openxmlformats.org/drawingml/2006/main" xmlns:r="http://schemas.openxmlformats.org/officeDocument/2006/relationships" xmlns:p="http://schemas.openxmlformats.org/presentationml/2006/main">
   <p:cSld>
     <p:spTree>
@@ -1575,7 +1663,7 @@
           <a:p>
             <a:fld id="{C801310E-4C28-4D51-ADB4-8E3E74A70742}" type="datetimeFigureOut">
               <a:rPr kumimoji="1" lang="ja-JP" altLang="en-US" smtClean="0"/>
-              <a:t>2022/5/19</a:t>
+              <a:t>2022/6/28</a:t>
             </a:fld>
             <a:endParaRPr kumimoji="1" lang="ja-JP" altLang="en-US"/>
           </a:p>
@@ -1805,7 +1893,7 @@
           <a:p>
             <a:fld id="{C801310E-4C28-4D51-ADB4-8E3E74A70742}" type="datetimeFigureOut">
               <a:rPr kumimoji="1" lang="ja-JP" altLang="en-US" smtClean="0"/>
-              <a:t>2022/5/19</a:t>
+              <a:t>2022/6/28</a:t>
             </a:fld>
             <a:endParaRPr kumimoji="1" lang="ja-JP" altLang="en-US"/>
           </a:p>
@@ -2045,7 +2133,7 @@
           <a:p>
             <a:fld id="{C801310E-4C28-4D51-ADB4-8E3E74A70742}" type="datetimeFigureOut">
               <a:rPr kumimoji="1" lang="ja-JP" altLang="en-US" smtClean="0"/>
-              <a:t>2022/5/19</a:t>
+              <a:t>2022/6/28</a:t>
             </a:fld>
             <a:endParaRPr kumimoji="1" lang="ja-JP" altLang="en-US"/>
           </a:p>
@@ -2275,7 +2363,7 @@
           <a:p>
             <a:fld id="{C801310E-4C28-4D51-ADB4-8E3E74A70742}" type="datetimeFigureOut">
               <a:rPr kumimoji="1" lang="ja-JP" altLang="en-US" smtClean="0"/>
-              <a:t>2022/5/19</a:t>
+              <a:t>2022/6/28</a:t>
             </a:fld>
             <a:endParaRPr kumimoji="1" lang="ja-JP" altLang="en-US"/>
           </a:p>
@@ -2550,7 +2638,7 @@
           <a:p>
             <a:fld id="{C801310E-4C28-4D51-ADB4-8E3E74A70742}" type="datetimeFigureOut">
               <a:rPr kumimoji="1" lang="ja-JP" altLang="en-US" smtClean="0"/>
-              <a:t>2022/5/19</a:t>
+              <a:t>2022/6/28</a:t>
             </a:fld>
             <a:endParaRPr kumimoji="1" lang="ja-JP" altLang="en-US"/>
           </a:p>
@@ -2879,7 +2967,7 @@
           <a:p>
             <a:fld id="{C801310E-4C28-4D51-ADB4-8E3E74A70742}" type="datetimeFigureOut">
               <a:rPr kumimoji="1" lang="ja-JP" altLang="en-US" smtClean="0"/>
-              <a:t>2022/5/19</a:t>
+              <a:t>2022/6/28</a:t>
             </a:fld>
             <a:endParaRPr kumimoji="1" lang="ja-JP" altLang="en-US"/>
           </a:p>
@@ -3355,7 +3443,7 @@
           <a:p>
             <a:fld id="{C801310E-4C28-4D51-ADB4-8E3E74A70742}" type="datetimeFigureOut">
               <a:rPr kumimoji="1" lang="ja-JP" altLang="en-US" smtClean="0"/>
-              <a:t>2022/5/19</a:t>
+              <a:t>2022/6/28</a:t>
             </a:fld>
             <a:endParaRPr kumimoji="1" lang="ja-JP" altLang="en-US"/>
           </a:p>
@@ -3496,7 +3584,7 @@
           <a:p>
             <a:fld id="{C801310E-4C28-4D51-ADB4-8E3E74A70742}" type="datetimeFigureOut">
               <a:rPr kumimoji="1" lang="ja-JP" altLang="en-US" smtClean="0"/>
-              <a:t>2022/5/19</a:t>
+              <a:t>2022/6/28</a:t>
             </a:fld>
             <a:endParaRPr kumimoji="1" lang="ja-JP" altLang="en-US"/>
           </a:p>
@@ -3609,7 +3697,7 @@
           <a:p>
             <a:fld id="{C801310E-4C28-4D51-ADB4-8E3E74A70742}" type="datetimeFigureOut">
               <a:rPr kumimoji="1" lang="ja-JP" altLang="en-US" smtClean="0"/>
-              <a:t>2022/5/19</a:t>
+              <a:t>2022/6/28</a:t>
             </a:fld>
             <a:endParaRPr kumimoji="1" lang="ja-JP" altLang="en-US"/>
           </a:p>
@@ -3952,7 +4040,7 @@
           <a:p>
             <a:fld id="{C801310E-4C28-4D51-ADB4-8E3E74A70742}" type="datetimeFigureOut">
               <a:rPr kumimoji="1" lang="ja-JP" altLang="en-US" smtClean="0"/>
-              <a:t>2022/5/19</a:t>
+              <a:t>2022/6/28</a:t>
             </a:fld>
             <a:endParaRPr kumimoji="1" lang="ja-JP" altLang="en-US"/>
           </a:p>
@@ -4240,7 +4328,7 @@
           <a:p>
             <a:fld id="{C801310E-4C28-4D51-ADB4-8E3E74A70742}" type="datetimeFigureOut">
               <a:rPr kumimoji="1" lang="ja-JP" altLang="en-US" smtClean="0"/>
-              <a:t>2022/5/19</a:t>
+              <a:t>2022/6/28</a:t>
             </a:fld>
             <a:endParaRPr kumimoji="1" lang="ja-JP" altLang="en-US"/>
           </a:p>
@@ -4513,7 +4601,7 @@
           <a:p>
             <a:fld id="{C801310E-4C28-4D51-ADB4-8E3E74A70742}" type="datetimeFigureOut">
               <a:rPr kumimoji="1" lang="ja-JP" altLang="en-US" smtClean="0"/>
-              <a:t>2022/5/19</a:t>
+              <a:t>2022/6/28</a:t>
             </a:fld>
             <a:endParaRPr kumimoji="1" lang="ja-JP" altLang="en-US"/>
           </a:p>
@@ -9608,7 +9696,7 @@
           </a:ln>
           <a:extLst>
             <a:ext uri="{C572A759-6A51-4108-AA02-DFA0A04FC94B}">
-              <ma14:wrappingTextBoxFlag xmlns:lc="http://schemas.openxmlformats.org/drawingml/2006/lockedCanvas" xmlns:ma14="http://schemas.microsoft.com/office/mac/drawingml/2011/main" xmlns:a14="http://schemas.microsoft.com/office/drawing/2010/main" xmlns:m="http://schemas.openxmlformats.org/officeDocument/2006/math" xmlns="" val="1"/>
+              <ma14:wrappingTextBoxFlag xmlns="" xmlns:m="http://schemas.openxmlformats.org/officeDocument/2006/math" xmlns:a14="http://schemas.microsoft.com/office/drawing/2010/main" xmlns:ma14="http://schemas.microsoft.com/office/mac/drawingml/2011/main" xmlns:lc="http://schemas.openxmlformats.org/drawingml/2006/lockedCanvas" val="1"/>
             </a:ext>
           </a:extLst>
         </p:spPr>
@@ -9948,7 +10036,7 @@
           </a:ln>
           <a:extLst>
             <a:ext uri="{C572A759-6A51-4108-AA02-DFA0A04FC94B}">
-              <ma14:wrappingTextBoxFlag xmlns:lc="http://schemas.openxmlformats.org/drawingml/2006/lockedCanvas" xmlns:ma14="http://schemas.microsoft.com/office/mac/drawingml/2011/main" xmlns:a14="http://schemas.microsoft.com/office/drawing/2010/main" xmlns:m="http://schemas.openxmlformats.org/officeDocument/2006/math" xmlns="" val="1"/>
+              <ma14:wrappingTextBoxFlag xmlns="" xmlns:m="http://schemas.openxmlformats.org/officeDocument/2006/math" xmlns:a14="http://schemas.microsoft.com/office/drawing/2010/main" xmlns:ma14="http://schemas.microsoft.com/office/mac/drawingml/2011/main" xmlns:lc="http://schemas.openxmlformats.org/drawingml/2006/lockedCanvas" val="1"/>
             </a:ext>
           </a:extLst>
         </p:spPr>
@@ -10288,7 +10376,7 @@
           </a:ln>
           <a:extLst>
             <a:ext uri="{C572A759-6A51-4108-AA02-DFA0A04FC94B}">
-              <ma14:wrappingTextBoxFlag xmlns:lc="http://schemas.openxmlformats.org/drawingml/2006/lockedCanvas" xmlns:ma14="http://schemas.microsoft.com/office/mac/drawingml/2011/main" xmlns:a14="http://schemas.microsoft.com/office/drawing/2010/main" xmlns:m="http://schemas.openxmlformats.org/officeDocument/2006/math" xmlns="" val="1"/>
+              <ma14:wrappingTextBoxFlag xmlns="" xmlns:m="http://schemas.openxmlformats.org/officeDocument/2006/math" xmlns:a14="http://schemas.microsoft.com/office/drawing/2010/main" xmlns:ma14="http://schemas.microsoft.com/office/mac/drawingml/2011/main" xmlns:lc="http://schemas.openxmlformats.org/drawingml/2006/lockedCanvas" val="1"/>
             </a:ext>
           </a:extLst>
         </p:spPr>
@@ -10628,7 +10716,7 @@
           </a:ln>
           <a:extLst>
             <a:ext uri="{C572A759-6A51-4108-AA02-DFA0A04FC94B}">
-              <ma14:wrappingTextBoxFlag xmlns:lc="http://schemas.openxmlformats.org/drawingml/2006/lockedCanvas" xmlns:ma14="http://schemas.microsoft.com/office/mac/drawingml/2011/main" xmlns:a14="http://schemas.microsoft.com/office/drawing/2010/main" xmlns:m="http://schemas.openxmlformats.org/officeDocument/2006/math" xmlns="" val="1"/>
+              <ma14:wrappingTextBoxFlag xmlns="" xmlns:m="http://schemas.openxmlformats.org/officeDocument/2006/math" xmlns:a14="http://schemas.microsoft.com/office/drawing/2010/main" xmlns:ma14="http://schemas.microsoft.com/office/mac/drawingml/2011/main" xmlns:lc="http://schemas.openxmlformats.org/drawingml/2006/lockedCanvas" val="1"/>
             </a:ext>
           </a:extLst>
         </p:spPr>
@@ -10968,7 +11056,7 @@
           </a:ln>
           <a:extLst>
             <a:ext uri="{C572A759-6A51-4108-AA02-DFA0A04FC94B}">
-              <ma14:wrappingTextBoxFlag xmlns:lc="http://schemas.openxmlformats.org/drawingml/2006/lockedCanvas" xmlns:ma14="http://schemas.microsoft.com/office/mac/drawingml/2011/main" xmlns:a14="http://schemas.microsoft.com/office/drawing/2010/main" xmlns:m="http://schemas.openxmlformats.org/officeDocument/2006/math" xmlns="" val="1"/>
+              <ma14:wrappingTextBoxFlag xmlns="" xmlns:m="http://schemas.openxmlformats.org/officeDocument/2006/math" xmlns:a14="http://schemas.microsoft.com/office/drawing/2010/main" xmlns:ma14="http://schemas.microsoft.com/office/mac/drawingml/2011/main" xmlns:lc="http://schemas.openxmlformats.org/drawingml/2006/lockedCanvas" val="1"/>
             </a:ext>
           </a:extLst>
         </p:spPr>
@@ -11308,7 +11396,7 @@
           </a:ln>
           <a:extLst>
             <a:ext uri="{C572A759-6A51-4108-AA02-DFA0A04FC94B}">
-              <ma14:wrappingTextBoxFlag xmlns:lc="http://schemas.openxmlformats.org/drawingml/2006/lockedCanvas" xmlns:ma14="http://schemas.microsoft.com/office/mac/drawingml/2011/main" xmlns:a14="http://schemas.microsoft.com/office/drawing/2010/main" xmlns:m="http://schemas.openxmlformats.org/officeDocument/2006/math" xmlns="" val="1"/>
+              <ma14:wrappingTextBoxFlag xmlns="" xmlns:m="http://schemas.openxmlformats.org/officeDocument/2006/math" xmlns:a14="http://schemas.microsoft.com/office/drawing/2010/main" xmlns:ma14="http://schemas.microsoft.com/office/mac/drawingml/2011/main" xmlns:lc="http://schemas.openxmlformats.org/drawingml/2006/lockedCanvas" val="1"/>
             </a:ext>
           </a:extLst>
         </p:spPr>

</xml_diff>

<commit_message>
change parameter: c, dt
</commit_message>
<xml_diff>
--- a/slide/0519.pptx
+++ b/slide/0519.pptx
@@ -14303,8 +14303,8 @@
           </p:sp>
         </mc:Fallback>
       </mc:AlternateContent>
-      <mc:AlternateContent xmlns:mc="http://schemas.openxmlformats.org/markup-compatibility/2006" xmlns:a14="http://schemas.microsoft.com/office/drawing/2010/main">
-        <mc:Choice Requires="a14">
+      <mc:AlternateContent xmlns:mc="http://schemas.openxmlformats.org/markup-compatibility/2006">
+        <mc:Choice xmlns:a14="http://schemas.microsoft.com/office/drawing/2010/main" Requires="a14">
           <p:sp>
             <p:nvSpPr>
               <p:cNvPr id="17" name="テキスト ボックス 16">
@@ -14409,14 +14409,18 @@
                   </m:oMath>
                 </a14:m>
                 <a:r>
+                  <a:rPr kumimoji="1" lang="ja-JP" altLang="en-US"/>
+                  <a:t>についてとくと出力面に</a:t>
+                </a:r>
+                <a:r>
                   <a:rPr kumimoji="1" lang="ja-JP" altLang="en-US" dirty="0"/>
-                  <a:t>についてとくと入射面における境界条件は</a:t>
+                  <a:t>おける境界条件は</a:t>
                 </a:r>
               </a:p>
             </p:txBody>
           </p:sp>
         </mc:Choice>
-        <mc:Fallback xmlns="">
+        <mc:Fallback>
           <p:sp>
             <p:nvSpPr>
               <p:cNvPr id="17" name="テキスト ボックス 16">

</xml_diff>